<commit_message>
Fixes to decks 1 and 5
</commit_message>
<xml_diff>
--- a/Slides/1 - Introducing React.pptx
+++ b/Slides/1 - Introducing React.pptx
@@ -1032,6 +1032,13 @@
     <dgm:pt modelId="{69814B6E-35A6-4E4D-B40F-8BF4AE8EFD69}">
       <dgm:prSet phldrT="[Text]"/>
       <dgm:spPr/>
+      <dgm:t>
+        <a:bodyPr/>
+        <a:lstStyle/>
+        <a:p>
+          <a:endParaRPr lang="en-US"/>
+        </a:p>
+      </dgm:t>
     </dgm:pt>
     <dgm:pt modelId="{0A597D6C-0014-48AE-B5DB-1EDD421CFF8B}" type="parTrans" cxnId="{7E0929D7-899F-4608-A207-64700137A60D}">
       <dgm:prSet/>
@@ -1329,17 +1336,17 @@
     </dgm:pt>
   </dgm:ptLst>
   <dgm:cxnLst>
+    <dgm:cxn modelId="{47F95022-A229-40C4-8D00-538C38F6C279}" type="presOf" srcId="{C90838C1-F946-4835-B599-1728B89E95C8}" destId="{160A7413-8143-4390-8BA1-75AF0C7C357D}" srcOrd="0" destOrd="0" presId="urn:microsoft.com/office/officeart/2005/8/layout/arrow2"/>
+    <dgm:cxn modelId="{6B082F8A-9D20-4B1D-9C4B-331C3F476648}" srcId="{59606DBD-3D0B-411F-8482-7E618843941F}" destId="{C90838C1-F946-4835-B599-1728B89E95C8}" srcOrd="3" destOrd="0" parTransId="{4CDEAA0B-53B5-442D-89D9-CF9DEC5DEA10}" sibTransId="{7A1F0F7D-D7F4-4DDA-A266-45FACAC65662}"/>
+    <dgm:cxn modelId="{485C9998-438A-4486-925B-1A031032386B}" type="presOf" srcId="{6A572E21-3A1C-4EEE-9A98-6F92230DE39F}" destId="{5CE69215-2406-46CC-9235-6658DD6B61CA}" srcOrd="0" destOrd="0" presId="urn:microsoft.com/office/officeart/2005/8/layout/arrow2"/>
+    <dgm:cxn modelId="{051B6502-591E-46F7-8F98-180881047333}" srcId="{59606DBD-3D0B-411F-8482-7E618843941F}" destId="{A83637F0-5681-4374-8ECE-2D29943F8621}" srcOrd="4" destOrd="0" parTransId="{86654439-FDC6-4CD1-B01E-A24EFBA7D247}" sibTransId="{BFA7A3B8-7F49-46CF-8917-8736BDD5E613}"/>
+    <dgm:cxn modelId="{BF976A5F-ADCD-474C-B66E-D229D9A9DD85}" type="presOf" srcId="{79114AEF-0CFD-414D-8EA9-02C9A5CB60B7}" destId="{03396D34-FFD6-4494-9BB1-FA7713204F26}" srcOrd="0" destOrd="0" presId="urn:microsoft.com/office/officeart/2005/8/layout/arrow2"/>
+    <dgm:cxn modelId="{D1835730-ADD1-4337-9D7F-B63FA5030B66}" type="presOf" srcId="{59606DBD-3D0B-411F-8482-7E618843941F}" destId="{474B8229-B642-4BA5-990D-122E5987711B}" srcOrd="0" destOrd="0" presId="urn:microsoft.com/office/officeart/2005/8/layout/arrow2"/>
+    <dgm:cxn modelId="{82ADAA40-4052-490B-A21D-1334CCBA52A4}" srcId="{59606DBD-3D0B-411F-8482-7E618843941F}" destId="{79114AEF-0CFD-414D-8EA9-02C9A5CB60B7}" srcOrd="2" destOrd="0" parTransId="{CB454C5D-A836-48A4-AD23-6897D54A68B8}" sibTransId="{873EAF95-36BB-43D1-A51F-9AC1A8D10480}"/>
+    <dgm:cxn modelId="{7ACE2438-CB3A-416C-AA5A-6445C6D3A7A1}" srcId="{59606DBD-3D0B-411F-8482-7E618843941F}" destId="{9D7CA6F3-A0EF-45A2-BC68-E02C6E0A897D}" srcOrd="1" destOrd="0" parTransId="{1C5E870F-E672-4329-A8AC-7EA462C69E24}" sibTransId="{2E3F8D2D-CE41-4167-B419-F18022452F8D}"/>
+    <dgm:cxn modelId="{7E0929D7-899F-4608-A207-64700137A60D}" srcId="{59606DBD-3D0B-411F-8482-7E618843941F}" destId="{69814B6E-35A6-4E4D-B40F-8BF4AE8EFD69}" srcOrd="5" destOrd="0" parTransId="{0A597D6C-0014-48AE-B5DB-1EDD421CFF8B}" sibTransId="{3C74D518-4183-48E6-B0B1-765C603E5440}"/>
+    <dgm:cxn modelId="{F44E27EE-01DB-46B3-9043-DEBC2EAE625D}" srcId="{59606DBD-3D0B-411F-8482-7E618843941F}" destId="{6A572E21-3A1C-4EEE-9A98-6F92230DE39F}" srcOrd="0" destOrd="0" parTransId="{32BF7B16-AABE-4447-AA4A-9A986FCAB664}" sibTransId="{1B25DD85-5384-4517-AED8-AA6CD7F9FA07}"/>
     <dgm:cxn modelId="{D18A3DA7-A452-4C92-8B42-EE7C131444C4}" type="presOf" srcId="{9D7CA6F3-A0EF-45A2-BC68-E02C6E0A897D}" destId="{C340CE4D-4FD3-4958-8FC9-F5A12180FF69}" srcOrd="0" destOrd="0" presId="urn:microsoft.com/office/officeart/2005/8/layout/arrow2"/>
-    <dgm:cxn modelId="{47F95022-A229-40C4-8D00-538C38F6C279}" type="presOf" srcId="{C90838C1-F946-4835-B599-1728B89E95C8}" destId="{160A7413-8143-4390-8BA1-75AF0C7C357D}" srcOrd="0" destOrd="0" presId="urn:microsoft.com/office/officeart/2005/8/layout/arrow2"/>
-    <dgm:cxn modelId="{7ACE2438-CB3A-416C-AA5A-6445C6D3A7A1}" srcId="{59606DBD-3D0B-411F-8482-7E618843941F}" destId="{9D7CA6F3-A0EF-45A2-BC68-E02C6E0A897D}" srcOrd="1" destOrd="0" parTransId="{1C5E870F-E672-4329-A8AC-7EA462C69E24}" sibTransId="{2E3F8D2D-CE41-4167-B419-F18022452F8D}"/>
-    <dgm:cxn modelId="{D1835730-ADD1-4337-9D7F-B63FA5030B66}" type="presOf" srcId="{59606DBD-3D0B-411F-8482-7E618843941F}" destId="{474B8229-B642-4BA5-990D-122E5987711B}" srcOrd="0" destOrd="0" presId="urn:microsoft.com/office/officeart/2005/8/layout/arrow2"/>
-    <dgm:cxn modelId="{7E0929D7-899F-4608-A207-64700137A60D}" srcId="{59606DBD-3D0B-411F-8482-7E618843941F}" destId="{69814B6E-35A6-4E4D-B40F-8BF4AE8EFD69}" srcOrd="5" destOrd="0" parTransId="{0A597D6C-0014-48AE-B5DB-1EDD421CFF8B}" sibTransId="{3C74D518-4183-48E6-B0B1-765C603E5440}"/>
-    <dgm:cxn modelId="{82ADAA40-4052-490B-A21D-1334CCBA52A4}" srcId="{59606DBD-3D0B-411F-8482-7E618843941F}" destId="{79114AEF-0CFD-414D-8EA9-02C9A5CB60B7}" srcOrd="2" destOrd="0" parTransId="{CB454C5D-A836-48A4-AD23-6897D54A68B8}" sibTransId="{873EAF95-36BB-43D1-A51F-9AC1A8D10480}"/>
-    <dgm:cxn modelId="{F44E27EE-01DB-46B3-9043-DEBC2EAE625D}" srcId="{59606DBD-3D0B-411F-8482-7E618843941F}" destId="{6A572E21-3A1C-4EEE-9A98-6F92230DE39F}" srcOrd="0" destOrd="0" parTransId="{32BF7B16-AABE-4447-AA4A-9A986FCAB664}" sibTransId="{1B25DD85-5384-4517-AED8-AA6CD7F9FA07}"/>
-    <dgm:cxn modelId="{485C9998-438A-4486-925B-1A031032386B}" type="presOf" srcId="{6A572E21-3A1C-4EEE-9A98-6F92230DE39F}" destId="{5CE69215-2406-46CC-9235-6658DD6B61CA}" srcOrd="0" destOrd="0" presId="urn:microsoft.com/office/officeart/2005/8/layout/arrow2"/>
-    <dgm:cxn modelId="{BF976A5F-ADCD-474C-B66E-D229D9A9DD85}" type="presOf" srcId="{79114AEF-0CFD-414D-8EA9-02C9A5CB60B7}" destId="{03396D34-FFD6-4494-9BB1-FA7713204F26}" srcOrd="0" destOrd="0" presId="urn:microsoft.com/office/officeart/2005/8/layout/arrow2"/>
-    <dgm:cxn modelId="{6B082F8A-9D20-4B1D-9C4B-331C3F476648}" srcId="{59606DBD-3D0B-411F-8482-7E618843941F}" destId="{C90838C1-F946-4835-B599-1728B89E95C8}" srcOrd="3" destOrd="0" parTransId="{4CDEAA0B-53B5-442D-89D9-CF9DEC5DEA10}" sibTransId="{7A1F0F7D-D7F4-4DDA-A266-45FACAC65662}"/>
-    <dgm:cxn modelId="{051B6502-591E-46F7-8F98-180881047333}" srcId="{59606DBD-3D0B-411F-8482-7E618843941F}" destId="{A83637F0-5681-4374-8ECE-2D29943F8621}" srcOrd="4" destOrd="0" parTransId="{86654439-FDC6-4CD1-B01E-A24EFBA7D247}" sibTransId="{BFA7A3B8-7F49-46CF-8917-8736BDD5E613}"/>
     <dgm:cxn modelId="{D05EAF01-B2DB-4FD0-82C0-F2249344296F}" type="presOf" srcId="{A83637F0-5681-4374-8ECE-2D29943F8621}" destId="{AC086E67-57C1-4A1C-8B03-6023B590D671}" srcOrd="0" destOrd="0" presId="urn:microsoft.com/office/officeart/2005/8/layout/arrow2"/>
     <dgm:cxn modelId="{AB3885C2-F01F-4D85-80D5-4839D2581541}" type="presParOf" srcId="{474B8229-B642-4BA5-990D-122E5987711B}" destId="{0BA82D91-A9CE-4EB3-B9C5-919667D573D7}" srcOrd="0" destOrd="0" presId="urn:microsoft.com/office/officeart/2005/8/layout/arrow2"/>
     <dgm:cxn modelId="{6BE3EEF5-29F2-41F7-B25C-B8777B11996C}" type="presParOf" srcId="{474B8229-B642-4BA5-990D-122E5987711B}" destId="{E04655E1-51E6-4CA7-8374-93C604957C21}" srcOrd="1" destOrd="0" presId="urn:microsoft.com/office/officeart/2005/8/layout/arrow2"/>
@@ -4761,7 +4768,7 @@
           <a:p>
             <a:fld id="{A9DDBD42-E139-45FA-9C16-1611187CAC3F}" type="datetimeFigureOut">
               <a:rPr lang="en-US" smtClean="0"/>
-              <a:t>10/17/2015</a:t>
+              <a:t>10/19/2015</a:t>
             </a:fld>
             <a:endParaRPr lang="en-US"/>
           </a:p>
@@ -8553,11 +8560,7 @@
           <a:p>
             <a:r>
               <a:rPr lang="en-US" sz="4000" dirty="0" smtClean="0"/>
-              <a:t>Introducing </a:t>
-            </a:r>
-            <a:r>
-              <a:rPr lang="en-US" sz="4000" dirty="0" smtClean="0"/>
-              <a:t>React.js</a:t>
+              <a:t>Introducing React.js</a:t>
             </a:r>
             <a:endParaRPr lang="en-US" sz="4000" dirty="0"/>
           </a:p>
@@ -8795,15 +8798,7 @@
           <a:p>
             <a:r>
               <a:rPr lang="en-US" dirty="0" smtClean="0"/>
-              <a:t>What </a:t>
-            </a:r>
-            <a:r>
-              <a:rPr lang="en-US" dirty="0" smtClean="0"/>
-              <a:t>React.js </a:t>
-            </a:r>
-            <a:r>
-              <a:rPr lang="en-US" dirty="0" smtClean="0"/>
-              <a:t>isn’t</a:t>
+              <a:t>What React.js isn’t</a:t>
             </a:r>
             <a:endParaRPr lang="en-US" dirty="0"/>
           </a:p>
@@ -8835,11 +8830,7 @@
           <a:p>
             <a:r>
               <a:rPr lang="en-US" dirty="0" smtClean="0"/>
-              <a:t>React </a:t>
-            </a:r>
-            <a:r>
-              <a:rPr lang="en-US" dirty="0" smtClean="0"/>
-              <a:t>doesn’t compete with jQuery</a:t>
+              <a:t>React doesn’t compete with jQuery</a:t>
             </a:r>
           </a:p>
           <a:p>
@@ -8983,15 +8974,7 @@
           <a:p>
             <a:r>
               <a:rPr lang="en-US" dirty="0" smtClean="0"/>
-              <a:t>What </a:t>
-            </a:r>
-            <a:r>
-              <a:rPr lang="en-US" dirty="0" smtClean="0"/>
-              <a:t>React.js </a:t>
-            </a:r>
-            <a:r>
-              <a:rPr lang="en-US" dirty="0" smtClean="0"/>
-              <a:t>isn’t</a:t>
+              <a:t>What React.js isn’t</a:t>
             </a:r>
             <a:endParaRPr lang="en-US" dirty="0"/>
           </a:p>
@@ -9023,11 +9006,7 @@
           <a:p>
             <a:r>
               <a:rPr lang="en-US" dirty="0" smtClean="0"/>
-              <a:t>React </a:t>
-            </a:r>
-            <a:r>
-              <a:rPr lang="en-US" dirty="0" smtClean="0"/>
-              <a:t>doesn’t compete with jQuery</a:t>
+              <a:t>React doesn’t compete with jQuery</a:t>
             </a:r>
           </a:p>
           <a:p>
@@ -9158,11 +9137,7 @@
           <a:p>
             <a:r>
               <a:rPr lang="en-US" dirty="0" smtClean="0"/>
-              <a:t>React.js </a:t>
-            </a:r>
-            <a:r>
-              <a:rPr lang="en-US" dirty="0" smtClean="0"/>
-              <a:t>concepts</a:t>
+              <a:t>React.js concepts</a:t>
             </a:r>
             <a:endParaRPr lang="en-US" dirty="0"/>
           </a:p>
@@ -9199,7 +9174,6 @@
               <a:rPr lang="en-US" dirty="0" smtClean="0"/>
               <a:t>Unidirectional Data Flow</a:t>
             </a:r>
-            <a:endParaRPr lang="en-US" dirty="0" smtClean="0"/>
           </a:p>
         </p:txBody>
       </p:sp>
@@ -9887,11 +9861,11 @@
   <p:clrMapOvr>
     <a:masterClrMapping/>
   </p:clrMapOvr>
-  <mc:AlternateContent xmlns:mc="http://schemas.openxmlformats.org/markup-compatibility/2006">
-    <mc:Choice xmlns:p14="http://schemas.microsoft.com/office/powerpoint/2010/main" Requires="p14">
+  <mc:AlternateContent xmlns:mc="http://schemas.openxmlformats.org/markup-compatibility/2006" xmlns:p14="http://schemas.microsoft.com/office/powerpoint/2010/main">
+    <mc:Choice Requires="p14">
       <p:transition spd="slow" p14:dur="2000"/>
     </mc:Choice>
-    <mc:Fallback>
+    <mc:Fallback xmlns="">
       <p:transition spd="slow"/>
     </mc:Fallback>
   </mc:AlternateContent>
@@ -9941,7 +9915,6 @@
               <a:rPr lang="en-US" dirty="0"/>
               <a:t>TODO: Make slides about components and unidirectional data flow</a:t>
             </a:r>
-            <a:endParaRPr lang="en-US" dirty="0"/>
           </a:p>
         </p:txBody>
       </p:sp>
@@ -10793,11 +10766,11 @@
   <p:clrMapOvr>
     <a:masterClrMapping/>
   </p:clrMapOvr>
-  <mc:AlternateContent xmlns:mc="http://schemas.openxmlformats.org/markup-compatibility/2006">
-    <mc:Choice xmlns:p14="http://schemas.microsoft.com/office/powerpoint/2010/main" Requires="p14">
+  <mc:AlternateContent xmlns:mc="http://schemas.openxmlformats.org/markup-compatibility/2006" xmlns:p14="http://schemas.microsoft.com/office/powerpoint/2010/main">
+    <mc:Choice Requires="p14">
       <p:transition spd="slow" p14:dur="2000"/>
     </mc:Choice>
-    <mc:Fallback>
+    <mc:Fallback xmlns="">
       <p:transition spd="slow"/>
     </mc:Fallback>
   </mc:AlternateContent>
@@ -11115,15 +11088,7 @@
           <a:p>
             <a:r>
               <a:rPr lang="en-CA" dirty="0" smtClean="0"/>
-              <a:t>Getting </a:t>
-            </a:r>
-            <a:r>
-              <a:rPr lang="en-CA" dirty="0" smtClean="0"/>
-              <a:t>React.js </a:t>
-            </a:r>
-            <a:r>
-              <a:rPr lang="en-CA" dirty="0" smtClean="0"/>
-              <a:t>with NuGet</a:t>
+              <a:t>Getting React.js with NuGet</a:t>
             </a:r>
             <a:endParaRPr lang="en-US" dirty="0"/>
           </a:p>
@@ -11183,15 +11148,7 @@
           <a:p>
             <a:r>
               <a:rPr lang="en-CA" dirty="0" smtClean="0"/>
-              <a:t>Getting </a:t>
-            </a:r>
-            <a:r>
-              <a:rPr lang="en-CA" dirty="0" smtClean="0"/>
-              <a:t>React.js </a:t>
-            </a:r>
-            <a:r>
-              <a:rPr lang="en-CA" dirty="0" smtClean="0"/>
-              <a:t>with Bower</a:t>
+              <a:t>Getting React.js with Bower</a:t>
             </a:r>
             <a:endParaRPr lang="en-US" dirty="0"/>
           </a:p>
@@ -11251,15 +11208,7 @@
           <a:p>
             <a:r>
               <a:rPr lang="en-CA" dirty="0" smtClean="0"/>
-              <a:t>Using </a:t>
-            </a:r>
-            <a:r>
-              <a:rPr lang="en-CA" dirty="0" smtClean="0"/>
-              <a:t>React.js </a:t>
-            </a:r>
-            <a:r>
-              <a:rPr lang="en-CA" dirty="0" smtClean="0"/>
-              <a:t>from CDN</a:t>
+              <a:t>Using React.js from CDN</a:t>
             </a:r>
             <a:endParaRPr lang="en-US" dirty="0"/>
           </a:p>
@@ -11319,11 +11268,7 @@
           <a:p>
             <a:r>
               <a:rPr lang="en-US" dirty="0" smtClean="0"/>
-              <a:t>Hello, </a:t>
-            </a:r>
-            <a:r>
-              <a:rPr lang="en-US" dirty="0" smtClean="0"/>
-              <a:t>React.js</a:t>
+              <a:t>Hello, React.js</a:t>
             </a:r>
             <a:endParaRPr lang="en-US" dirty="0"/>
           </a:p>
@@ -11402,11 +11347,7 @@
           <a:p>
             <a:r>
               <a:rPr lang="en-US" dirty="0" smtClean="0"/>
-              <a:t>Hello, </a:t>
-            </a:r>
-            <a:r>
-              <a:rPr lang="en-US" dirty="0" smtClean="0"/>
-              <a:t>React.js</a:t>
+              <a:t>Hello, React.js</a:t>
             </a:r>
             <a:endParaRPr lang="en-US" dirty="0"/>
           </a:p>
@@ -11937,7 +11878,7 @@
             <p:ph sz="quarter" idx="10"/>
             <p:extLst>
               <p:ext uri="{D42A27DB-BD31-4B8C-83A1-F6EECF244321}">
-                <p14:modId xmlns:p14="http://schemas.microsoft.com/office/powerpoint/2010/main" val="2870417669"/>
+                <p14:modId xmlns:p14="http://schemas.microsoft.com/office/powerpoint/2010/main" val="3806505291"/>
               </p:ext>
             </p:extLst>
           </p:nvPr>
@@ -11979,7 +11920,7 @@
                           <a:latin typeface="Segoe UI Light" panose="020B0502040204020203" pitchFamily="34" charset="0"/>
                           <a:cs typeface="Segoe UI Light" panose="020B0502040204020203" pitchFamily="34" charset="0"/>
                         </a:rPr>
-                        <a:t>Creating Dynamic Webpages With Knockout</a:t>
+                        <a:t>Creating Dynamic Webpages With React</a:t>
                       </a:r>
                       <a:endParaRPr lang="en-US" sz="3600" dirty="0">
                         <a:latin typeface="Segoe UI Light" panose="020B0502040204020203" pitchFamily="34" charset="0"/>
@@ -12016,14 +11957,7 @@
                           <a:latin typeface="Segoe UI Light" panose="020B0502040204020203" pitchFamily="34" charset="0"/>
                           <a:cs typeface="Segoe UI Light" panose="020B0502040204020203" pitchFamily="34" charset="0"/>
                         </a:rPr>
-                        <a:t>01 | </a:t>
-                      </a:r>
-                      <a:r>
-                        <a:rPr lang="en-US" sz="2800" dirty="0" smtClean="0">
-                          <a:latin typeface="Segoe UI Light" panose="020B0502040204020203" pitchFamily="34" charset="0"/>
-                          <a:cs typeface="Segoe UI Light" panose="020B0502040204020203" pitchFamily="34" charset="0"/>
-                        </a:rPr>
-                        <a:t>Introducing</a:t>
+                        <a:t>01 | Introducing</a:t>
                       </a:r>
                       <a:r>
                         <a:rPr lang="en-US" sz="2800" baseline="0" dirty="0" smtClean="0">
@@ -12050,14 +11984,7 @@
                           <a:latin typeface="Segoe UI Light" panose="020B0502040204020203" pitchFamily="34" charset="0"/>
                           <a:cs typeface="Segoe UI Light" panose="020B0502040204020203" pitchFamily="34" charset="0"/>
                         </a:rPr>
-                        <a:t>04 | </a:t>
-                      </a:r>
-                      <a:r>
-                        <a:rPr lang="en-US" sz="2800" dirty="0" smtClean="0">
-                          <a:latin typeface="Segoe UI Light" panose="020B0502040204020203" pitchFamily="34" charset="0"/>
-                          <a:cs typeface="Segoe UI Light" panose="020B0502040204020203" pitchFamily="34" charset="0"/>
-                        </a:rPr>
-                        <a:t>Working with Back-end Servers</a:t>
+                        <a:t>04 | Working with Back-end Servers</a:t>
                       </a:r>
                       <a:endParaRPr lang="en-US" sz="2800" dirty="0">
                         <a:latin typeface="Segoe UI Light" panose="020B0502040204020203" pitchFamily="34" charset="0"/>
@@ -12084,14 +12011,7 @@
                           <a:latin typeface="Segoe UI Light" panose="020B0502040204020203" pitchFamily="34" charset="0"/>
                           <a:cs typeface="Segoe UI Light" panose="020B0502040204020203" pitchFamily="34" charset="0"/>
                         </a:rPr>
-                        <a:t>02 | </a:t>
-                      </a:r>
-                      <a:r>
-                        <a:rPr lang="en-US" sz="2800" dirty="0" smtClean="0">
-                          <a:latin typeface="Segoe UI Light" panose="020B0502040204020203" pitchFamily="34" charset="0"/>
-                          <a:cs typeface="Segoe UI Light" panose="020B0502040204020203" pitchFamily="34" charset="0"/>
-                        </a:rPr>
-                        <a:t>Developer Setup</a:t>
+                        <a:t>02 | Developer Setup</a:t>
                       </a:r>
                       <a:endParaRPr lang="en-US" sz="2800" dirty="0">
                         <a:latin typeface="Segoe UI Light" panose="020B0502040204020203" pitchFamily="34" charset="0"/>
@@ -12111,14 +12031,7 @@
                           <a:latin typeface="Segoe UI Light" panose="020B0502040204020203" pitchFamily="34" charset="0"/>
                           <a:cs typeface="Segoe UI Light" panose="020B0502040204020203" pitchFamily="34" charset="0"/>
                         </a:rPr>
-                        <a:t>05 | </a:t>
-                      </a:r>
-                      <a:r>
-                        <a:rPr lang="en-US" sz="2800" dirty="0" smtClean="0">
-                          <a:latin typeface="Segoe UI Light" panose="020B0502040204020203" pitchFamily="34" charset="0"/>
-                          <a:cs typeface="Segoe UI Light" panose="020B0502040204020203" pitchFamily="34" charset="0"/>
-                        </a:rPr>
-                        <a:t>React Application Architectures with</a:t>
+                        <a:t>05 | React Application Architectures with</a:t>
                       </a:r>
                       <a:br>
                         <a:rPr lang="en-US" sz="2800" dirty="0" smtClean="0">
@@ -12182,14 +12095,7 @@
                           <a:latin typeface="Segoe UI Light" panose="020B0502040204020203" pitchFamily="34" charset="0"/>
                           <a:cs typeface="Segoe UI Light" panose="020B0502040204020203" pitchFamily="34" charset="0"/>
                         </a:rPr>
-                        <a:t> | </a:t>
-                      </a:r>
-                      <a:r>
-                        <a:rPr lang="en-US" sz="2800" baseline="0" dirty="0" smtClean="0">
-                          <a:latin typeface="Segoe UI Light" panose="020B0502040204020203" pitchFamily="34" charset="0"/>
-                          <a:cs typeface="Segoe UI Light" panose="020B0502040204020203" pitchFamily="34" charset="0"/>
-                        </a:rPr>
-                        <a:t>JSX Templates, Components</a:t>
+                        <a:t> | JSX Templates, Components</a:t>
                       </a:r>
                       <a:br>
                         <a:rPr lang="en-US" sz="2800" baseline="0" dirty="0" smtClean="0">
@@ -12342,13 +12248,8 @@
             <a:pPr lvl="1"/>
             <a:r>
               <a:rPr lang="en-US" dirty="0" smtClean="0"/>
-              <a:t>New to </a:t>
-            </a:r>
-            <a:r>
-              <a:rPr lang="en-US" dirty="0" smtClean="0"/>
-              <a:t>React.js</a:t>
-            </a:r>
-            <a:endParaRPr lang="en-US" dirty="0" smtClean="0"/>
+              <a:t>New to React.js</a:t>
+            </a:r>
           </a:p>
           <a:p>
             <a:pPr lvl="1"/>
@@ -12503,8 +12404,8 @@
               <a:t>Enter this code: </a:t>
             </a:r>
             <a:r>
-              <a:rPr lang="en-US" b="1" dirty="0" smtClean="0"/>
-              <a:t>[TODO]</a:t>
+              <a:rPr lang="en-US" b="1" dirty="0" err="1" smtClean="0"/>
+              <a:t>IntroReactJS</a:t>
             </a:r>
             <a:r>
               <a:rPr lang="en-US" dirty="0" smtClean="0"/>
@@ -12516,7 +12417,7 @@
             </a:r>
             <a:r>
               <a:rPr lang="en-US" dirty="0" smtClean="0"/>
-              <a:t>[TODO])</a:t>
+              <a:t>11/23/2015)</a:t>
             </a:r>
             <a:endParaRPr lang="en-US" dirty="0"/>
           </a:p>
@@ -12616,13 +12517,8 @@
           <a:p>
             <a:r>
               <a:rPr lang="en-CA" dirty="0" smtClean="0"/>
-              <a:t>Introducing </a:t>
-            </a:r>
-            <a:r>
-              <a:rPr lang="en-CA" dirty="0" smtClean="0"/>
-              <a:t>React.js</a:t>
-            </a:r>
-            <a:endParaRPr lang="en-CA" dirty="0" smtClean="0"/>
+              <a:t>Introducing React.js</a:t>
+            </a:r>
           </a:p>
         </p:txBody>
       </p:sp>
@@ -12709,7 +12605,7 @@
           <a:p>
             <a:r>
               <a:rPr lang="en-US" dirty="0" smtClean="0"/>
-              <a:t>Introducing Knockout</a:t>
+              <a:t>Introducing React</a:t>
             </a:r>
             <a:endParaRPr lang="en-US" dirty="0"/>
           </a:p>
@@ -12734,7 +12630,6 @@
               <a:rPr lang="en-US" dirty="0" smtClean="0"/>
               <a:t>Why React.js?</a:t>
             </a:r>
-            <a:endParaRPr lang="en-US" dirty="0" smtClean="0"/>
           </a:p>
           <a:p>
             <a:r>
@@ -12751,16 +12646,11 @@
               <a:rPr lang="en-US" dirty="0" smtClean="0"/>
               <a:t>Frameworks</a:t>
             </a:r>
-            <a:endParaRPr lang="en-US" dirty="0" smtClean="0"/>
           </a:p>
           <a:p>
             <a:r>
               <a:rPr lang="en-US" dirty="0" smtClean="0"/>
-              <a:t>Hello, </a:t>
-            </a:r>
-            <a:r>
-              <a:rPr lang="en-US" dirty="0" smtClean="0"/>
-              <a:t>Knockout</a:t>
+              <a:t>Hello, React</a:t>
             </a:r>
           </a:p>
         </p:txBody>

</xml_diff>